<commit_message>
update to the html and powerpoint
</commit_message>
<xml_diff>
--- a/Premier League 2020-21 - Working.pptx
+++ b/Premier League 2020-21 - Working.pptx
@@ -13445,34 +13445,40 @@
           </a:p>
         </p:txBody>
       </p:sp>
-      <p:sp>
-        <p:nvSpPr>
-          <p:cNvPr id="3" name="Content Placeholder 2">
+      <p:pic>
+        <p:nvPicPr>
+          <p:cNvPr id="5" name="Content Placeholder 4">
             <a:extLst>
               <a:ext uri="{FF2B5EF4-FFF2-40B4-BE49-F238E27FC236}">
-                <a16:creationId xmlns:a16="http://schemas.microsoft.com/office/drawing/2014/main" id="{7EBA5C5A-AA00-3B18-D147-C6FDF92AF321}"/>
+                <a16:creationId xmlns:a16="http://schemas.microsoft.com/office/drawing/2014/main" id="{5FBAFE5F-F224-016D-CCA5-9CE92AD9D7EA}"/>
               </a:ext>
             </a:extLst>
           </p:cNvPr>
-          <p:cNvSpPr>
-            <a:spLocks noGrp="1"/>
-          </p:cNvSpPr>
+          <p:cNvPicPr>
+            <a:picLocks noGrp="1" noChangeAspect="1"/>
+          </p:cNvPicPr>
           <p:nvPr>
             <p:ph idx="1"/>
           </p:nvPr>
-        </p:nvSpPr>
-        <p:spPr/>
-        <p:txBody>
-          <a:bodyPr/>
-          <a:lstStyle/>
-          <a:p>
-            <a:pPr marL="0" indent="0">
-              <a:buNone/>
-            </a:pPr>
-            <a:endParaRPr lang="en-US" dirty="0"/>
-          </a:p>
-        </p:txBody>
-      </p:sp>
+        </p:nvPicPr>
+        <p:blipFill>
+          <a:blip r:embed="rId2">
+            <a:extLst>
+              <a:ext uri="{28A0092B-C50C-407E-A947-70E740481C1C}">
+                <a14:useLocalDpi xmlns:a14="http://schemas.microsoft.com/office/drawing/2010/main" val="0"/>
+              </a:ext>
+            </a:extLst>
+          </a:blip>
+          <a:srcRect/>
+          <a:stretch/>
+        </p:blipFill>
+        <p:spPr>
+          <a:xfrm>
+            <a:off x="180169" y="2570672"/>
+            <a:ext cx="6186125" cy="3217653"/>
+          </a:xfrm>
+        </p:spPr>
+      </p:pic>
     </p:spTree>
     <p:extLst>
       <p:ext uri="{BB962C8B-B14F-4D97-AF65-F5344CB8AC3E}">
@@ -14363,15 +14369,20 @@
           <p:nvPr/>
         </p:nvPicPr>
         <p:blipFill>
-          <a:blip r:embed="rId2"/>
-          <a:stretch>
-            <a:fillRect/>
-          </a:stretch>
+          <a:blip r:embed="rId2">
+            <a:extLst>
+              <a:ext uri="{28A0092B-C50C-407E-A947-70E740481C1C}">
+                <a14:useLocalDpi xmlns:a14="http://schemas.microsoft.com/office/drawing/2010/main" val="0"/>
+              </a:ext>
+            </a:extLst>
+          </a:blip>
+          <a:srcRect/>
+          <a:stretch/>
         </p:blipFill>
         <p:spPr>
           <a:xfrm>
-            <a:off x="1154954" y="2933685"/>
-            <a:ext cx="3296276" cy="3778658"/>
+            <a:off x="700954" y="3184016"/>
+            <a:ext cx="2965272" cy="2948828"/>
           </a:xfrm>
           <a:prstGeom prst="rect">
             <a:avLst/>
@@ -14393,15 +14404,20 @@
           <p:nvPr/>
         </p:nvPicPr>
         <p:blipFill>
-          <a:blip r:embed="rId3"/>
-          <a:stretch>
-            <a:fillRect/>
-          </a:stretch>
+          <a:blip r:embed="rId3">
+            <a:extLst>
+              <a:ext uri="{28A0092B-C50C-407E-A947-70E740481C1C}">
+                <a14:useLocalDpi xmlns:a14="http://schemas.microsoft.com/office/drawing/2010/main" val="0"/>
+              </a:ext>
+            </a:extLst>
+          </a:blip>
+          <a:srcRect/>
+          <a:stretch/>
         </p:blipFill>
         <p:spPr>
           <a:xfrm>
-            <a:off x="4554870" y="2933685"/>
-            <a:ext cx="3721276" cy="2009251"/>
+            <a:off x="3946824" y="3183821"/>
+            <a:ext cx="4307959" cy="2948828"/>
           </a:xfrm>
           <a:prstGeom prst="rect">
             <a:avLst/>
@@ -14423,15 +14439,20 @@
           <p:nvPr/>
         </p:nvPicPr>
         <p:blipFill>
-          <a:blip r:embed="rId4"/>
-          <a:stretch>
-            <a:fillRect/>
-          </a:stretch>
+          <a:blip r:embed="rId4">
+            <a:extLst>
+              <a:ext uri="{28A0092B-C50C-407E-A947-70E740481C1C}">
+                <a14:useLocalDpi xmlns:a14="http://schemas.microsoft.com/office/drawing/2010/main" val="0"/>
+              </a:ext>
+            </a:extLst>
+          </a:blip>
+          <a:srcRect/>
+          <a:stretch/>
         </p:blipFill>
         <p:spPr>
           <a:xfrm>
-            <a:off x="8388386" y="2933685"/>
-            <a:ext cx="3102660" cy="3778658"/>
+            <a:off x="8429283" y="3184015"/>
+            <a:ext cx="3311268" cy="2948633"/>
           </a:xfrm>
           <a:prstGeom prst="rect">
             <a:avLst/>

</xml_diff>